<commit_message>
project structure updated with trainer form
</commit_message>
<xml_diff>
--- a/project3_talentberg/backend ppt documentation.pptx
+++ b/project3_talentberg/backend ppt documentation.pptx
@@ -16,6 +16,12 @@
     <p:sldId id="264" r:id="rId10"/>
     <p:sldId id="265" r:id="rId11"/>
     <p:sldId id="266" r:id="rId12"/>
+    <p:sldId id="267" r:id="rId13"/>
+    <p:sldId id="268" r:id="rId14"/>
+    <p:sldId id="269" r:id="rId15"/>
+    <p:sldId id="270" r:id="rId16"/>
+    <p:sldId id="272" r:id="rId17"/>
+    <p:sldId id="273" r:id="rId18"/>
   </p:sldIdLst>
   <p:sldSz cx="12192000" cy="6858000"/>
   <p:notesSz cx="6858000" cy="9144000"/>
@@ -269,7 +275,7 @@
           <a:p>
             <a:fld id="{F35C72CB-6D27-402C-AE57-3F460D704935}" type="datetimeFigureOut">
               <a:rPr lang="en-US" smtClean="0"/>
-              <a:t>8/5/2020</a:t>
+              <a:t>8/13/2020</a:t>
             </a:fld>
             <a:endParaRPr lang="en-US"/>
           </a:p>
@@ -467,7 +473,7 @@
           <a:p>
             <a:fld id="{F35C72CB-6D27-402C-AE57-3F460D704935}" type="datetimeFigureOut">
               <a:rPr lang="en-US" smtClean="0"/>
-              <a:t>8/5/2020</a:t>
+              <a:t>8/13/2020</a:t>
             </a:fld>
             <a:endParaRPr lang="en-US"/>
           </a:p>
@@ -675,7 +681,7 @@
           <a:p>
             <a:fld id="{F35C72CB-6D27-402C-AE57-3F460D704935}" type="datetimeFigureOut">
               <a:rPr lang="en-US" smtClean="0"/>
-              <a:t>8/5/2020</a:t>
+              <a:t>8/13/2020</a:t>
             </a:fld>
             <a:endParaRPr lang="en-US"/>
           </a:p>
@@ -873,7 +879,7 @@
           <a:p>
             <a:fld id="{F35C72CB-6D27-402C-AE57-3F460D704935}" type="datetimeFigureOut">
               <a:rPr lang="en-US" smtClean="0"/>
-              <a:t>8/5/2020</a:t>
+              <a:t>8/13/2020</a:t>
             </a:fld>
             <a:endParaRPr lang="en-US"/>
           </a:p>
@@ -1148,7 +1154,7 @@
           <a:p>
             <a:fld id="{F35C72CB-6D27-402C-AE57-3F460D704935}" type="datetimeFigureOut">
               <a:rPr lang="en-US" smtClean="0"/>
-              <a:t>8/5/2020</a:t>
+              <a:t>8/13/2020</a:t>
             </a:fld>
             <a:endParaRPr lang="en-US"/>
           </a:p>
@@ -1413,7 +1419,7 @@
           <a:p>
             <a:fld id="{F35C72CB-6D27-402C-AE57-3F460D704935}" type="datetimeFigureOut">
               <a:rPr lang="en-US" smtClean="0"/>
-              <a:t>8/5/2020</a:t>
+              <a:t>8/13/2020</a:t>
             </a:fld>
             <a:endParaRPr lang="en-US"/>
           </a:p>
@@ -1825,7 +1831,7 @@
           <a:p>
             <a:fld id="{F35C72CB-6D27-402C-AE57-3F460D704935}" type="datetimeFigureOut">
               <a:rPr lang="en-US" smtClean="0"/>
-              <a:t>8/5/2020</a:t>
+              <a:t>8/13/2020</a:t>
             </a:fld>
             <a:endParaRPr lang="en-US"/>
           </a:p>
@@ -1966,7 +1972,7 @@
           <a:p>
             <a:fld id="{F35C72CB-6D27-402C-AE57-3F460D704935}" type="datetimeFigureOut">
               <a:rPr lang="en-US" smtClean="0"/>
-              <a:t>8/5/2020</a:t>
+              <a:t>8/13/2020</a:t>
             </a:fld>
             <a:endParaRPr lang="en-US"/>
           </a:p>
@@ -2079,7 +2085,7 @@
           <a:p>
             <a:fld id="{F35C72CB-6D27-402C-AE57-3F460D704935}" type="datetimeFigureOut">
               <a:rPr lang="en-US" smtClean="0"/>
-              <a:t>8/5/2020</a:t>
+              <a:t>8/13/2020</a:t>
             </a:fld>
             <a:endParaRPr lang="en-US"/>
           </a:p>
@@ -2390,7 +2396,7 @@
           <a:p>
             <a:fld id="{F35C72CB-6D27-402C-AE57-3F460D704935}" type="datetimeFigureOut">
               <a:rPr lang="en-US" smtClean="0"/>
-              <a:t>8/5/2020</a:t>
+              <a:t>8/13/2020</a:t>
             </a:fld>
             <a:endParaRPr lang="en-US"/>
           </a:p>
@@ -2678,7 +2684,7 @@
           <a:p>
             <a:fld id="{F35C72CB-6D27-402C-AE57-3F460D704935}" type="datetimeFigureOut">
               <a:rPr lang="en-US" smtClean="0"/>
-              <a:t>8/5/2020</a:t>
+              <a:t>8/13/2020</a:t>
             </a:fld>
             <a:endParaRPr lang="en-US"/>
           </a:p>
@@ -2919,7 +2925,7 @@
           <a:p>
             <a:fld id="{F35C72CB-6D27-402C-AE57-3F460D704935}" type="datetimeFigureOut">
               <a:rPr lang="en-US" smtClean="0"/>
-              <a:t>8/5/2020</a:t>
+              <a:t>8/13/2020</a:t>
             </a:fld>
             <a:endParaRPr lang="en-US"/>
           </a:p>
@@ -3619,6 +3625,624 @@
 </p:sld>
 </file>
 
+<file path=ppt/slides/slide12.xml><?xml version="1.0" encoding="utf-8"?>
+<p:sld xmlns:a="http://schemas.openxmlformats.org/drawingml/2006/main" xmlns:r="http://schemas.openxmlformats.org/officeDocument/2006/relationships" xmlns:p="http://schemas.openxmlformats.org/presentationml/2006/main">
+  <p:cSld>
+    <p:spTree>
+      <p:nvGrpSpPr>
+        <p:cNvPr id="1" name=""/>
+        <p:cNvGrpSpPr/>
+        <p:nvPr/>
+      </p:nvGrpSpPr>
+      <p:grpSpPr>
+        <a:xfrm>
+          <a:off x="0" y="0"/>
+          <a:ext cx="0" cy="0"/>
+          <a:chOff x="0" y="0"/>
+          <a:chExt cx="0" cy="0"/>
+        </a:xfrm>
+      </p:grpSpPr>
+      <p:sp>
+        <p:nvSpPr>
+          <p:cNvPr id="2" name="TextBox 1">
+            <a:extLst>
+              <a:ext uri="{FF2B5EF4-FFF2-40B4-BE49-F238E27FC236}">
+                <a16:creationId xmlns:a16="http://schemas.microsoft.com/office/drawing/2014/main" id="{4DA1E48B-206C-424F-895A-D27E3BBB9A5B}"/>
+              </a:ext>
+            </a:extLst>
+          </p:cNvPr>
+          <p:cNvSpPr txBox="1"/>
+          <p:nvPr/>
+        </p:nvSpPr>
+        <p:spPr>
+          <a:xfrm>
+            <a:off x="2256182" y="2693504"/>
+            <a:ext cx="8567531" cy="1107996"/>
+          </a:xfrm>
+          <a:prstGeom prst="rect">
+            <a:avLst/>
+          </a:prstGeom>
+          <a:noFill/>
+        </p:spPr>
+        <p:txBody>
+          <a:bodyPr wrap="square" rtlCol="0">
+            <a:spAutoFit/>
+          </a:bodyPr>
+          <a:lstStyle/>
+          <a:p>
+            <a:r>
+              <a:rPr lang="en-US" sz="6600" dirty="0"/>
+              <a:t>Step 3 : Create Forms</a:t>
+            </a:r>
+            <a:endParaRPr lang="en-US" dirty="0"/>
+          </a:p>
+        </p:txBody>
+      </p:sp>
+    </p:spTree>
+    <p:extLst>
+      <p:ext uri="{BB962C8B-B14F-4D97-AF65-F5344CB8AC3E}">
+        <p14:creationId xmlns:p14="http://schemas.microsoft.com/office/powerpoint/2010/main" val="415594236"/>
+      </p:ext>
+    </p:extLst>
+  </p:cSld>
+  <p:clrMapOvr>
+    <a:masterClrMapping/>
+  </p:clrMapOvr>
+</p:sld>
+</file>
+
+<file path=ppt/slides/slide13.xml><?xml version="1.0" encoding="utf-8"?>
+<p:sld xmlns:a="http://schemas.openxmlformats.org/drawingml/2006/main" xmlns:r="http://schemas.openxmlformats.org/officeDocument/2006/relationships" xmlns:p="http://schemas.openxmlformats.org/presentationml/2006/main">
+  <p:cSld>
+    <p:spTree>
+      <p:nvGrpSpPr>
+        <p:cNvPr id="1" name=""/>
+        <p:cNvGrpSpPr/>
+        <p:nvPr/>
+      </p:nvGrpSpPr>
+      <p:grpSpPr>
+        <a:xfrm>
+          <a:off x="0" y="0"/>
+          <a:ext cx="0" cy="0"/>
+          <a:chOff x="0" y="0"/>
+          <a:chExt cx="0" cy="0"/>
+        </a:xfrm>
+      </p:grpSpPr>
+      <p:pic>
+        <p:nvPicPr>
+          <p:cNvPr id="3" name="Picture 2">
+            <a:extLst>
+              <a:ext uri="{FF2B5EF4-FFF2-40B4-BE49-F238E27FC236}">
+                <a16:creationId xmlns:a16="http://schemas.microsoft.com/office/drawing/2014/main" id="{A8E8DF0C-EBB5-4071-91B0-41F572169E57}"/>
+              </a:ext>
+            </a:extLst>
+          </p:cNvPr>
+          <p:cNvPicPr>
+            <a:picLocks noChangeAspect="1"/>
+          </p:cNvPicPr>
+          <p:nvPr/>
+        </p:nvPicPr>
+        <p:blipFill>
+          <a:blip r:embed="rId2"/>
+          <a:stretch>
+            <a:fillRect/>
+          </a:stretch>
+        </p:blipFill>
+        <p:spPr>
+          <a:xfrm>
+            <a:off x="677614" y="1262271"/>
+            <a:ext cx="10836772" cy="4814792"/>
+          </a:xfrm>
+          <a:prstGeom prst="rect">
+            <a:avLst/>
+          </a:prstGeom>
+        </p:spPr>
+      </p:pic>
+      <p:sp>
+        <p:nvSpPr>
+          <p:cNvPr id="4" name="TextBox 3">
+            <a:extLst>
+              <a:ext uri="{FF2B5EF4-FFF2-40B4-BE49-F238E27FC236}">
+                <a16:creationId xmlns:a16="http://schemas.microsoft.com/office/drawing/2014/main" id="{E00ADC70-569F-429A-9634-BB11656CC16D}"/>
+              </a:ext>
+            </a:extLst>
+          </p:cNvPr>
+          <p:cNvSpPr txBox="1"/>
+          <p:nvPr/>
+        </p:nvSpPr>
+        <p:spPr>
+          <a:xfrm>
+            <a:off x="677614" y="530160"/>
+            <a:ext cx="7802217" cy="369332"/>
+          </a:xfrm>
+          <a:prstGeom prst="rect">
+            <a:avLst/>
+          </a:prstGeom>
+          <a:noFill/>
+        </p:spPr>
+        <p:txBody>
+          <a:bodyPr wrap="square" rtlCol="0">
+            <a:spAutoFit/>
+          </a:bodyPr>
+          <a:lstStyle/>
+          <a:p>
+            <a:r>
+              <a:rPr lang="en-US" dirty="0"/>
+              <a:t>Create </a:t>
+            </a:r>
+            <a:r>
+              <a:rPr lang="en-US" dirty="0" err="1"/>
+              <a:t>TrainerRegistrationForm</a:t>
+            </a:r>
+            <a:r>
+              <a:rPr lang="en-US" dirty="0"/>
+              <a:t> in forms.py file</a:t>
+            </a:r>
+          </a:p>
+        </p:txBody>
+      </p:sp>
+    </p:spTree>
+    <p:extLst>
+      <p:ext uri="{BB962C8B-B14F-4D97-AF65-F5344CB8AC3E}">
+        <p14:creationId xmlns:p14="http://schemas.microsoft.com/office/powerpoint/2010/main" val="784193104"/>
+      </p:ext>
+    </p:extLst>
+  </p:cSld>
+  <p:clrMapOvr>
+    <a:masterClrMapping/>
+  </p:clrMapOvr>
+</p:sld>
+</file>
+
+<file path=ppt/slides/slide14.xml><?xml version="1.0" encoding="utf-8"?>
+<p:sld xmlns:a="http://schemas.openxmlformats.org/drawingml/2006/main" xmlns:r="http://schemas.openxmlformats.org/officeDocument/2006/relationships" xmlns:p="http://schemas.openxmlformats.org/presentationml/2006/main">
+  <p:cSld>
+    <p:spTree>
+      <p:nvGrpSpPr>
+        <p:cNvPr id="1" name=""/>
+        <p:cNvGrpSpPr/>
+        <p:nvPr/>
+      </p:nvGrpSpPr>
+      <p:grpSpPr>
+        <a:xfrm>
+          <a:off x="0" y="0"/>
+          <a:ext cx="0" cy="0"/>
+          <a:chOff x="0" y="0"/>
+          <a:chExt cx="0" cy="0"/>
+        </a:xfrm>
+      </p:grpSpPr>
+      <p:sp>
+        <p:nvSpPr>
+          <p:cNvPr id="5" name="TextBox 4">
+            <a:extLst>
+              <a:ext uri="{FF2B5EF4-FFF2-40B4-BE49-F238E27FC236}">
+                <a16:creationId xmlns:a16="http://schemas.microsoft.com/office/drawing/2014/main" id="{083458F1-DFF7-4546-8458-DF0E1D3EE544}"/>
+              </a:ext>
+            </a:extLst>
+          </p:cNvPr>
+          <p:cNvSpPr txBox="1"/>
+          <p:nvPr/>
+        </p:nvSpPr>
+        <p:spPr>
+          <a:xfrm>
+            <a:off x="1600200" y="2133845"/>
+            <a:ext cx="10035209" cy="1323439"/>
+          </a:xfrm>
+          <a:prstGeom prst="rect">
+            <a:avLst/>
+          </a:prstGeom>
+          <a:noFill/>
+        </p:spPr>
+        <p:txBody>
+          <a:bodyPr wrap="square" rtlCol="0">
+            <a:spAutoFit/>
+          </a:bodyPr>
+          <a:lstStyle/>
+          <a:p>
+            <a:r>
+              <a:rPr lang="en-US" sz="4000" dirty="0"/>
+              <a:t>Step4 : Update Project Structure for Django Template Driven Forms</a:t>
+            </a:r>
+            <a:endParaRPr lang="en-US" dirty="0"/>
+          </a:p>
+        </p:txBody>
+      </p:sp>
+    </p:spTree>
+    <p:extLst>
+      <p:ext uri="{BB962C8B-B14F-4D97-AF65-F5344CB8AC3E}">
+        <p14:creationId xmlns:p14="http://schemas.microsoft.com/office/powerpoint/2010/main" val="135426228"/>
+      </p:ext>
+    </p:extLst>
+  </p:cSld>
+  <p:clrMapOvr>
+    <a:masterClrMapping/>
+  </p:clrMapOvr>
+</p:sld>
+</file>
+
+<file path=ppt/slides/slide15.xml><?xml version="1.0" encoding="utf-8"?>
+<p:sld xmlns:a="http://schemas.openxmlformats.org/drawingml/2006/main" xmlns:r="http://schemas.openxmlformats.org/officeDocument/2006/relationships" xmlns:p="http://schemas.openxmlformats.org/presentationml/2006/main">
+  <p:cSld>
+    <p:spTree>
+      <p:nvGrpSpPr>
+        <p:cNvPr id="1" name=""/>
+        <p:cNvGrpSpPr/>
+        <p:nvPr/>
+      </p:nvGrpSpPr>
+      <p:grpSpPr>
+        <a:xfrm>
+          <a:off x="0" y="0"/>
+          <a:ext cx="0" cy="0"/>
+          <a:chOff x="0" y="0"/>
+          <a:chExt cx="0" cy="0"/>
+        </a:xfrm>
+      </p:grpSpPr>
+      <p:pic>
+        <p:nvPicPr>
+          <p:cNvPr id="11" name="Picture 10">
+            <a:extLst>
+              <a:ext uri="{FF2B5EF4-FFF2-40B4-BE49-F238E27FC236}">
+                <a16:creationId xmlns:a16="http://schemas.microsoft.com/office/drawing/2014/main" id="{9D805074-8B32-45FF-AB9F-39C50D71FB3A}"/>
+              </a:ext>
+            </a:extLst>
+          </p:cNvPr>
+          <p:cNvPicPr>
+            <a:picLocks noChangeAspect="1"/>
+          </p:cNvPicPr>
+          <p:nvPr/>
+        </p:nvPicPr>
+        <p:blipFill>
+          <a:blip r:embed="rId2"/>
+          <a:stretch>
+            <a:fillRect/>
+          </a:stretch>
+        </p:blipFill>
+        <p:spPr>
+          <a:xfrm>
+            <a:off x="1814245" y="988260"/>
+            <a:ext cx="2381372" cy="5080261"/>
+          </a:xfrm>
+          <a:prstGeom prst="rect">
+            <a:avLst/>
+          </a:prstGeom>
+        </p:spPr>
+      </p:pic>
+      <p:sp>
+        <p:nvSpPr>
+          <p:cNvPr id="12" name="TextBox 11">
+            <a:extLst>
+              <a:ext uri="{FF2B5EF4-FFF2-40B4-BE49-F238E27FC236}">
+                <a16:creationId xmlns:a16="http://schemas.microsoft.com/office/drawing/2014/main" id="{31DEA985-B19B-4350-A2EC-916610D4FAE8}"/>
+              </a:ext>
+            </a:extLst>
+          </p:cNvPr>
+          <p:cNvSpPr txBox="1"/>
+          <p:nvPr/>
+        </p:nvSpPr>
+        <p:spPr>
+          <a:xfrm>
+            <a:off x="5039139" y="1828800"/>
+            <a:ext cx="3756991" cy="923330"/>
+          </a:xfrm>
+          <a:prstGeom prst="rect">
+            <a:avLst/>
+          </a:prstGeom>
+          <a:noFill/>
+        </p:spPr>
+        <p:txBody>
+          <a:bodyPr wrap="square" rtlCol="0">
+            <a:spAutoFit/>
+          </a:bodyPr>
+          <a:lstStyle/>
+          <a:p>
+            <a:r>
+              <a:rPr lang="en-US" dirty="0"/>
+              <a:t>Create </a:t>
+            </a:r>
+            <a:r>
+              <a:rPr lang="en-US" b="1" dirty="0"/>
+              <a:t>static</a:t>
+            </a:r>
+            <a:r>
+              <a:rPr lang="en-US" dirty="0"/>
+              <a:t> and </a:t>
+            </a:r>
+            <a:r>
+              <a:rPr lang="en-US" b="1" dirty="0"/>
+              <a:t>templates</a:t>
+            </a:r>
+            <a:r>
+              <a:rPr lang="en-US" dirty="0"/>
+              <a:t> folder in project root where templates you use for master layout of your </a:t>
+            </a:r>
+            <a:r>
+              <a:rPr lang="en-US" dirty="0" err="1"/>
+              <a:t>webside</a:t>
+            </a:r>
+            <a:r>
+              <a:rPr lang="en-US" dirty="0"/>
+              <a:t>.</a:t>
+            </a:r>
+          </a:p>
+        </p:txBody>
+      </p:sp>
+    </p:spTree>
+    <p:extLst>
+      <p:ext uri="{BB962C8B-B14F-4D97-AF65-F5344CB8AC3E}">
+        <p14:creationId xmlns:p14="http://schemas.microsoft.com/office/powerpoint/2010/main" val="3907322829"/>
+      </p:ext>
+    </p:extLst>
+  </p:cSld>
+  <p:clrMapOvr>
+    <a:masterClrMapping/>
+  </p:clrMapOvr>
+</p:sld>
+</file>
+
+<file path=ppt/slides/slide16.xml><?xml version="1.0" encoding="utf-8"?>
+<p:sld xmlns:a="http://schemas.openxmlformats.org/drawingml/2006/main" xmlns:r="http://schemas.openxmlformats.org/officeDocument/2006/relationships" xmlns:p="http://schemas.openxmlformats.org/presentationml/2006/main">
+  <p:cSld>
+    <p:spTree>
+      <p:nvGrpSpPr>
+        <p:cNvPr id="1" name=""/>
+        <p:cNvGrpSpPr/>
+        <p:nvPr/>
+      </p:nvGrpSpPr>
+      <p:grpSpPr>
+        <a:xfrm>
+          <a:off x="0" y="0"/>
+          <a:ext cx="0" cy="0"/>
+          <a:chOff x="0" y="0"/>
+          <a:chExt cx="0" cy="0"/>
+        </a:xfrm>
+      </p:grpSpPr>
+      <p:pic>
+        <p:nvPicPr>
+          <p:cNvPr id="3" name="Picture 2">
+            <a:extLst>
+              <a:ext uri="{FF2B5EF4-FFF2-40B4-BE49-F238E27FC236}">
+                <a16:creationId xmlns:a16="http://schemas.microsoft.com/office/drawing/2014/main" id="{E8A92CD3-67BC-40BB-B962-50E8B5D89525}"/>
+              </a:ext>
+            </a:extLst>
+          </p:cNvPr>
+          <p:cNvPicPr>
+            <a:picLocks noChangeAspect="1"/>
+          </p:cNvPicPr>
+          <p:nvPr/>
+        </p:nvPicPr>
+        <p:blipFill>
+          <a:blip r:embed="rId2"/>
+          <a:stretch>
+            <a:fillRect/>
+          </a:stretch>
+        </p:blipFill>
+        <p:spPr>
+          <a:xfrm>
+            <a:off x="801894" y="4015931"/>
+            <a:ext cx="8839654" cy="984301"/>
+          </a:xfrm>
+          <a:prstGeom prst="rect">
+            <a:avLst/>
+          </a:prstGeom>
+        </p:spPr>
+      </p:pic>
+      <p:pic>
+        <p:nvPicPr>
+          <p:cNvPr id="5" name="Picture 4">
+            <a:extLst>
+              <a:ext uri="{FF2B5EF4-FFF2-40B4-BE49-F238E27FC236}">
+                <a16:creationId xmlns:a16="http://schemas.microsoft.com/office/drawing/2014/main" id="{48A33DEF-24B6-4819-9F48-C8E2B5328FA0}"/>
+              </a:ext>
+            </a:extLst>
+          </p:cNvPr>
+          <p:cNvPicPr>
+            <a:picLocks noChangeAspect="1"/>
+          </p:cNvPicPr>
+          <p:nvPr/>
+        </p:nvPicPr>
+        <p:blipFill>
+          <a:blip r:embed="rId3"/>
+          <a:stretch>
+            <a:fillRect/>
+          </a:stretch>
+        </p:blipFill>
+        <p:spPr>
+          <a:xfrm>
+            <a:off x="921755" y="1901137"/>
+            <a:ext cx="3848298" cy="958899"/>
+          </a:xfrm>
+          <a:prstGeom prst="rect">
+            <a:avLst/>
+          </a:prstGeom>
+        </p:spPr>
+      </p:pic>
+      <p:sp>
+        <p:nvSpPr>
+          <p:cNvPr id="6" name="TextBox 5">
+            <a:extLst>
+              <a:ext uri="{FF2B5EF4-FFF2-40B4-BE49-F238E27FC236}">
+                <a16:creationId xmlns:a16="http://schemas.microsoft.com/office/drawing/2014/main" id="{AFF6C973-25DB-4781-BCFB-4A94206EB363}"/>
+              </a:ext>
+            </a:extLst>
+          </p:cNvPr>
+          <p:cNvSpPr txBox="1"/>
+          <p:nvPr/>
+        </p:nvSpPr>
+        <p:spPr>
+          <a:xfrm>
+            <a:off x="921755" y="1003852"/>
+            <a:ext cx="8599932" cy="369332"/>
+          </a:xfrm>
+          <a:prstGeom prst="rect">
+            <a:avLst/>
+          </a:prstGeom>
+          <a:noFill/>
+        </p:spPr>
+        <p:txBody>
+          <a:bodyPr wrap="square" rtlCol="0">
+            <a:spAutoFit/>
+          </a:bodyPr>
+          <a:lstStyle/>
+          <a:p>
+            <a:r>
+              <a:rPr lang="en-US" dirty="0"/>
+              <a:t>In settings.py add following code </a:t>
+            </a:r>
+          </a:p>
+        </p:txBody>
+      </p:sp>
+      <p:sp>
+        <p:nvSpPr>
+          <p:cNvPr id="7" name="TextBox 6">
+            <a:extLst>
+              <a:ext uri="{FF2B5EF4-FFF2-40B4-BE49-F238E27FC236}">
+                <a16:creationId xmlns:a16="http://schemas.microsoft.com/office/drawing/2014/main" id="{619CE036-F31E-45C1-B36B-A57CC3078EDA}"/>
+              </a:ext>
+            </a:extLst>
+          </p:cNvPr>
+          <p:cNvSpPr txBox="1"/>
+          <p:nvPr/>
+        </p:nvSpPr>
+        <p:spPr>
+          <a:xfrm>
+            <a:off x="800320" y="3499393"/>
+            <a:ext cx="5295680" cy="369332"/>
+          </a:xfrm>
+          <a:prstGeom prst="rect">
+            <a:avLst/>
+          </a:prstGeom>
+          <a:noFill/>
+        </p:spPr>
+        <p:txBody>
+          <a:bodyPr wrap="none" rtlCol="0">
+            <a:spAutoFit/>
+          </a:bodyPr>
+          <a:lstStyle/>
+          <a:p>
+            <a:r>
+              <a:rPr lang="en-US" dirty="0"/>
+              <a:t>Run python command </a:t>
+            </a:r>
+            <a:r>
+              <a:rPr lang="en-US" b="1" dirty="0"/>
+              <a:t>python manage.py </a:t>
+            </a:r>
+            <a:r>
+              <a:rPr lang="en-US" b="1" dirty="0" err="1"/>
+              <a:t>collectstatic</a:t>
+            </a:r>
+            <a:endParaRPr lang="en-US" b="1" dirty="0"/>
+          </a:p>
+        </p:txBody>
+      </p:sp>
+    </p:spTree>
+    <p:extLst>
+      <p:ext uri="{BB962C8B-B14F-4D97-AF65-F5344CB8AC3E}">
+        <p14:creationId xmlns:p14="http://schemas.microsoft.com/office/powerpoint/2010/main" val="1461465415"/>
+      </p:ext>
+    </p:extLst>
+  </p:cSld>
+  <p:clrMapOvr>
+    <a:masterClrMapping/>
+  </p:clrMapOvr>
+</p:sld>
+</file>
+
+<file path=ppt/slides/slide17.xml><?xml version="1.0" encoding="utf-8"?>
+<p:sld xmlns:a="http://schemas.openxmlformats.org/drawingml/2006/main" xmlns:r="http://schemas.openxmlformats.org/officeDocument/2006/relationships" xmlns:p="http://schemas.openxmlformats.org/presentationml/2006/main">
+  <p:cSld>
+    <p:spTree>
+      <p:nvGrpSpPr>
+        <p:cNvPr id="1" name=""/>
+        <p:cNvGrpSpPr/>
+        <p:nvPr/>
+      </p:nvGrpSpPr>
+      <p:grpSpPr>
+        <a:xfrm>
+          <a:off x="0" y="0"/>
+          <a:ext cx="0" cy="0"/>
+          <a:chOff x="0" y="0"/>
+          <a:chExt cx="0" cy="0"/>
+        </a:xfrm>
+      </p:grpSpPr>
+      <p:pic>
+        <p:nvPicPr>
+          <p:cNvPr id="3" name="Picture 2">
+            <a:extLst>
+              <a:ext uri="{FF2B5EF4-FFF2-40B4-BE49-F238E27FC236}">
+                <a16:creationId xmlns:a16="http://schemas.microsoft.com/office/drawing/2014/main" id="{C5CEC195-0BCF-4B45-80C4-5F8467DD3957}"/>
+              </a:ext>
+            </a:extLst>
+          </p:cNvPr>
+          <p:cNvPicPr>
+            <a:picLocks noChangeAspect="1"/>
+          </p:cNvPicPr>
+          <p:nvPr/>
+        </p:nvPicPr>
+        <p:blipFill>
+          <a:blip r:embed="rId2"/>
+          <a:stretch>
+            <a:fillRect/>
+          </a:stretch>
+        </p:blipFill>
+        <p:spPr>
+          <a:xfrm>
+            <a:off x="2010672" y="2256183"/>
+            <a:ext cx="7627254" cy="3198803"/>
+          </a:xfrm>
+          <a:prstGeom prst="rect">
+            <a:avLst/>
+          </a:prstGeom>
+        </p:spPr>
+      </p:pic>
+      <p:sp>
+        <p:nvSpPr>
+          <p:cNvPr id="4" name="TextBox 3">
+            <a:extLst>
+              <a:ext uri="{FF2B5EF4-FFF2-40B4-BE49-F238E27FC236}">
+                <a16:creationId xmlns:a16="http://schemas.microsoft.com/office/drawing/2014/main" id="{081E7B60-C3C7-4D61-B3CC-C694158D033B}"/>
+              </a:ext>
+            </a:extLst>
+          </p:cNvPr>
+          <p:cNvSpPr txBox="1"/>
+          <p:nvPr/>
+        </p:nvSpPr>
+        <p:spPr>
+          <a:xfrm>
+            <a:off x="2107096" y="1152939"/>
+            <a:ext cx="8080513" cy="369332"/>
+          </a:xfrm>
+          <a:prstGeom prst="rect">
+            <a:avLst/>
+          </a:prstGeom>
+          <a:noFill/>
+        </p:spPr>
+        <p:txBody>
+          <a:bodyPr wrap="square" rtlCol="0">
+            <a:spAutoFit/>
+          </a:bodyPr>
+          <a:lstStyle/>
+          <a:p>
+            <a:r>
+              <a:rPr lang="en-US" dirty="0"/>
+              <a:t>Change TEMPLATES settings in settings.py file </a:t>
+            </a:r>
+          </a:p>
+        </p:txBody>
+      </p:sp>
+    </p:spTree>
+    <p:extLst>
+      <p:ext uri="{BB962C8B-B14F-4D97-AF65-F5344CB8AC3E}">
+        <p14:creationId xmlns:p14="http://schemas.microsoft.com/office/powerpoint/2010/main" val="1662816202"/>
+      </p:ext>
+    </p:extLst>
+  </p:cSld>
+  <p:clrMapOvr>
+    <a:masterClrMapping/>
+  </p:clrMapOvr>
+</p:sld>
+</file>
+
 <file path=ppt/slides/slide2.xml><?xml version="1.0" encoding="utf-8"?>
 <p:sld xmlns:a="http://schemas.openxmlformats.org/drawingml/2006/main" xmlns:r="http://schemas.openxmlformats.org/officeDocument/2006/relationships" xmlns:p="http://schemas.openxmlformats.org/presentationml/2006/main">
   <p:cSld>

</xml_diff>

<commit_message>
presentation updated with form screenshots
</commit_message>
<xml_diff>
--- a/project3_talentberg/backend ppt documentation.pptx
+++ b/project3_talentberg/backend ppt documentation.pptx
@@ -22,6 +22,9 @@
     <p:sldId id="270" r:id="rId16"/>
     <p:sldId id="272" r:id="rId17"/>
     <p:sldId id="273" r:id="rId18"/>
+    <p:sldId id="276" r:id="rId19"/>
+    <p:sldId id="274" r:id="rId20"/>
+    <p:sldId id="275" r:id="rId21"/>
   </p:sldIdLst>
   <p:sldSz cx="12192000" cy="6858000"/>
   <p:notesSz cx="6858000" cy="9144000"/>
@@ -4243,6 +4246,179 @@
 </p:sld>
 </file>
 
+<file path=ppt/slides/slide18.xml><?xml version="1.0" encoding="utf-8"?>
+<p:sld xmlns:a="http://schemas.openxmlformats.org/drawingml/2006/main" xmlns:r="http://schemas.openxmlformats.org/officeDocument/2006/relationships" xmlns:p="http://schemas.openxmlformats.org/presentationml/2006/main">
+  <p:cSld>
+    <p:spTree>
+      <p:nvGrpSpPr>
+        <p:cNvPr id="1" name=""/>
+        <p:cNvGrpSpPr/>
+        <p:nvPr/>
+      </p:nvGrpSpPr>
+      <p:grpSpPr>
+        <a:xfrm>
+          <a:off x="0" y="0"/>
+          <a:ext cx="0" cy="0"/>
+          <a:chOff x="0" y="0"/>
+          <a:chExt cx="0" cy="0"/>
+        </a:xfrm>
+      </p:grpSpPr>
+      <p:sp>
+        <p:nvSpPr>
+          <p:cNvPr id="5" name="TextBox 4">
+            <a:extLst>
+              <a:ext uri="{FF2B5EF4-FFF2-40B4-BE49-F238E27FC236}">
+                <a16:creationId xmlns:a16="http://schemas.microsoft.com/office/drawing/2014/main" id="{083458F1-DFF7-4546-8458-DF0E1D3EE544}"/>
+              </a:ext>
+            </a:extLst>
+          </p:cNvPr>
+          <p:cNvSpPr txBox="1"/>
+          <p:nvPr/>
+        </p:nvSpPr>
+        <p:spPr>
+          <a:xfrm>
+            <a:off x="1600200" y="2133845"/>
+            <a:ext cx="10035209" cy="1323439"/>
+          </a:xfrm>
+          <a:prstGeom prst="rect">
+            <a:avLst/>
+          </a:prstGeom>
+          <a:noFill/>
+        </p:spPr>
+        <p:txBody>
+          <a:bodyPr wrap="square" rtlCol="0">
+            <a:spAutoFit/>
+          </a:bodyPr>
+          <a:lstStyle/>
+          <a:p>
+            <a:r>
+              <a:rPr lang="en-US" sz="4000" dirty="0"/>
+              <a:t>Step5 : Design layout.html as master form and trainer-create.html as child form</a:t>
+            </a:r>
+            <a:endParaRPr lang="en-US" dirty="0"/>
+          </a:p>
+        </p:txBody>
+      </p:sp>
+    </p:spTree>
+    <p:extLst>
+      <p:ext uri="{BB962C8B-B14F-4D97-AF65-F5344CB8AC3E}">
+        <p14:creationId xmlns:p14="http://schemas.microsoft.com/office/powerpoint/2010/main" val="1020160727"/>
+      </p:ext>
+    </p:extLst>
+  </p:cSld>
+  <p:clrMapOvr>
+    <a:masterClrMapping/>
+  </p:clrMapOvr>
+</p:sld>
+</file>
+
+<file path=ppt/slides/slide19.xml><?xml version="1.0" encoding="utf-8"?>
+<p:sld xmlns:a="http://schemas.openxmlformats.org/drawingml/2006/main" xmlns:r="http://schemas.openxmlformats.org/officeDocument/2006/relationships" xmlns:p="http://schemas.openxmlformats.org/presentationml/2006/main">
+  <p:cSld>
+    <p:spTree>
+      <p:nvGrpSpPr>
+        <p:cNvPr id="1" name=""/>
+        <p:cNvGrpSpPr/>
+        <p:nvPr/>
+      </p:nvGrpSpPr>
+      <p:grpSpPr>
+        <a:xfrm>
+          <a:off x="0" y="0"/>
+          <a:ext cx="0" cy="0"/>
+          <a:chOff x="0" y="0"/>
+          <a:chExt cx="0" cy="0"/>
+        </a:xfrm>
+      </p:grpSpPr>
+      <p:sp>
+        <p:nvSpPr>
+          <p:cNvPr id="2" name="TextBox 1">
+            <a:extLst>
+              <a:ext uri="{FF2B5EF4-FFF2-40B4-BE49-F238E27FC236}">
+                <a16:creationId xmlns:a16="http://schemas.microsoft.com/office/drawing/2014/main" id="{90B567ED-A7A3-4F73-97E4-778ACCE7CABD}"/>
+              </a:ext>
+            </a:extLst>
+          </p:cNvPr>
+          <p:cNvSpPr txBox="1"/>
+          <p:nvPr/>
+        </p:nvSpPr>
+        <p:spPr>
+          <a:xfrm>
+            <a:off x="665922" y="844826"/>
+            <a:ext cx="8925339" cy="1200329"/>
+          </a:xfrm>
+          <a:prstGeom prst="rect">
+            <a:avLst/>
+          </a:prstGeom>
+          <a:noFill/>
+        </p:spPr>
+        <p:txBody>
+          <a:bodyPr wrap="square" rtlCol="0">
+            <a:spAutoFit/>
+          </a:bodyPr>
+          <a:lstStyle/>
+          <a:p>
+            <a:r>
+              <a:rPr lang="en-US" b="1" dirty="0"/>
+              <a:t>Link : layout.html code</a:t>
+            </a:r>
+          </a:p>
+          <a:p>
+            <a:endParaRPr lang="en-US" dirty="0"/>
+          </a:p>
+          <a:p>
+            <a:r>
+              <a:rPr lang="en-US" dirty="0">
+                <a:hlinkClick r:id="rId2"/>
+              </a:rPr>
+              <a:t>https://github.com/shrenik77130/Repo3Batch17PythonFS/blob/master/project3_talentberg/backendapp/templates/layout.html</a:t>
+            </a:r>
+            <a:endParaRPr lang="en-US" dirty="0"/>
+          </a:p>
+        </p:txBody>
+      </p:sp>
+      <p:pic>
+        <p:nvPicPr>
+          <p:cNvPr id="4" name="Picture 3">
+            <a:extLst>
+              <a:ext uri="{FF2B5EF4-FFF2-40B4-BE49-F238E27FC236}">
+                <a16:creationId xmlns:a16="http://schemas.microsoft.com/office/drawing/2014/main" id="{C25F40E8-5CC8-4EC6-8E60-30657043CAE1}"/>
+              </a:ext>
+            </a:extLst>
+          </p:cNvPr>
+          <p:cNvPicPr>
+            <a:picLocks noChangeAspect="1"/>
+          </p:cNvPicPr>
+          <p:nvPr/>
+        </p:nvPicPr>
+        <p:blipFill>
+          <a:blip r:embed="rId3"/>
+          <a:stretch>
+            <a:fillRect/>
+          </a:stretch>
+        </p:blipFill>
+        <p:spPr>
+          <a:xfrm>
+            <a:off x="2600738" y="2446721"/>
+            <a:ext cx="6331275" cy="3892750"/>
+          </a:xfrm>
+          <a:prstGeom prst="rect">
+            <a:avLst/>
+          </a:prstGeom>
+        </p:spPr>
+      </p:pic>
+    </p:spTree>
+    <p:extLst>
+      <p:ext uri="{BB962C8B-B14F-4D97-AF65-F5344CB8AC3E}">
+        <p14:creationId xmlns:p14="http://schemas.microsoft.com/office/powerpoint/2010/main" val="1466774517"/>
+      </p:ext>
+    </p:extLst>
+  </p:cSld>
+  <p:clrMapOvr>
+    <a:masterClrMapping/>
+  </p:clrMapOvr>
+</p:sld>
+</file>
+
 <file path=ppt/slides/slide2.xml><?xml version="1.0" encoding="utf-8"?>
 <p:sld xmlns:a="http://schemas.openxmlformats.org/drawingml/2006/main" xmlns:r="http://schemas.openxmlformats.org/officeDocument/2006/relationships" xmlns:p="http://schemas.openxmlformats.org/presentationml/2006/main">
   <p:cSld>
@@ -4329,6 +4505,113 @@
     <p:extLst>
       <p:ext uri="{BB962C8B-B14F-4D97-AF65-F5344CB8AC3E}">
         <p14:creationId xmlns:p14="http://schemas.microsoft.com/office/powerpoint/2010/main" val="3153473336"/>
+      </p:ext>
+    </p:extLst>
+  </p:cSld>
+  <p:clrMapOvr>
+    <a:masterClrMapping/>
+  </p:clrMapOvr>
+</p:sld>
+</file>
+
+<file path=ppt/slides/slide20.xml><?xml version="1.0" encoding="utf-8"?>
+<p:sld xmlns:a="http://schemas.openxmlformats.org/drawingml/2006/main" xmlns:r="http://schemas.openxmlformats.org/officeDocument/2006/relationships" xmlns:p="http://schemas.openxmlformats.org/presentationml/2006/main">
+  <p:cSld>
+    <p:spTree>
+      <p:nvGrpSpPr>
+        <p:cNvPr id="1" name=""/>
+        <p:cNvGrpSpPr/>
+        <p:nvPr/>
+      </p:nvGrpSpPr>
+      <p:grpSpPr>
+        <a:xfrm>
+          <a:off x="0" y="0"/>
+          <a:ext cx="0" cy="0"/>
+          <a:chOff x="0" y="0"/>
+          <a:chExt cx="0" cy="0"/>
+        </a:xfrm>
+      </p:grpSpPr>
+      <p:sp>
+        <p:nvSpPr>
+          <p:cNvPr id="2" name="TextBox 1">
+            <a:extLst>
+              <a:ext uri="{FF2B5EF4-FFF2-40B4-BE49-F238E27FC236}">
+                <a16:creationId xmlns:a16="http://schemas.microsoft.com/office/drawing/2014/main" id="{5EE55675-F3B5-41DA-B8C3-4EF4ED76C21A}"/>
+              </a:ext>
+            </a:extLst>
+          </p:cNvPr>
+          <p:cNvSpPr txBox="1"/>
+          <p:nvPr/>
+        </p:nvSpPr>
+        <p:spPr>
+          <a:xfrm>
+            <a:off x="745435" y="834887"/>
+            <a:ext cx="10535478" cy="1200329"/>
+          </a:xfrm>
+          <a:prstGeom prst="rect">
+            <a:avLst/>
+          </a:prstGeom>
+          <a:noFill/>
+        </p:spPr>
+        <p:txBody>
+          <a:bodyPr wrap="square" rtlCol="0">
+            <a:spAutoFit/>
+          </a:bodyPr>
+          <a:lstStyle/>
+          <a:p>
+            <a:r>
+              <a:rPr lang="en-US" b="1" dirty="0"/>
+              <a:t>Link: create-trainer.html Code</a:t>
+            </a:r>
+          </a:p>
+          <a:p>
+            <a:endParaRPr lang="en-US" dirty="0"/>
+          </a:p>
+          <a:p>
+            <a:r>
+              <a:rPr lang="en-US" dirty="0">
+                <a:hlinkClick r:id="rId2"/>
+              </a:rPr>
+              <a:t>https://github.com/shrenik77130/Repo3Batch17PythonFS/blob/master/project3_talentberg/backendapp/trainer/templates/trainer/trainer_create.html</a:t>
+            </a:r>
+            <a:endParaRPr lang="en-US" dirty="0"/>
+          </a:p>
+        </p:txBody>
+      </p:sp>
+      <p:pic>
+        <p:nvPicPr>
+          <p:cNvPr id="4" name="Picture 3">
+            <a:extLst>
+              <a:ext uri="{FF2B5EF4-FFF2-40B4-BE49-F238E27FC236}">
+                <a16:creationId xmlns:a16="http://schemas.microsoft.com/office/drawing/2014/main" id="{8E8D650B-D484-4168-8085-8E087E24475C}"/>
+              </a:ext>
+            </a:extLst>
+          </p:cNvPr>
+          <p:cNvPicPr>
+            <a:picLocks noChangeAspect="1"/>
+          </p:cNvPicPr>
+          <p:nvPr/>
+        </p:nvPicPr>
+        <p:blipFill>
+          <a:blip r:embed="rId3"/>
+          <a:stretch>
+            <a:fillRect/>
+          </a:stretch>
+        </p:blipFill>
+        <p:spPr>
+          <a:xfrm>
+            <a:off x="1996844" y="2729322"/>
+            <a:ext cx="7593207" cy="3293791"/>
+          </a:xfrm>
+          <a:prstGeom prst="rect">
+            <a:avLst/>
+          </a:prstGeom>
+        </p:spPr>
+      </p:pic>
+    </p:spTree>
+    <p:extLst>
+      <p:ext uri="{BB962C8B-B14F-4D97-AF65-F5344CB8AC3E}">
+        <p14:creationId xmlns:p14="http://schemas.microsoft.com/office/powerpoint/2010/main" val="2869097533"/>
       </p:ext>
     </p:extLst>
   </p:cSld>

</xml_diff>